<commit_message>
Cuppa: Removed unused slides in figures.pptx
</commit_message>
<xml_diff>
--- a/cuppa/src/main/python/pycuppa/doc/figures.pptx
+++ b/cuppa/src/main/python/pycuppa/doc/figures.pptx
@@ -5,11 +5,9 @@
     <p:sldMasterId id="2147483660" r:id="rId4"/>
   </p:sldMasterIdLst>
   <p:sldIdLst>
-    <p:sldId id="269" r:id="rId5"/>
-    <p:sldId id="270" r:id="rId6"/>
-    <p:sldId id="271" r:id="rId7"/>
-    <p:sldId id="268" r:id="rId8"/>
-    <p:sldId id="272" r:id="rId9"/>
+    <p:sldId id="270" r:id="rId5"/>
+    <p:sldId id="271" r:id="rId6"/>
+    <p:sldId id="268" r:id="rId7"/>
   </p:sldIdLst>
   <p:sldSz cx="12192000" cy="6858000"/>
   <p:notesSz cx="6858000" cy="9144000"/>
@@ -113,11 +111,9 @@
       <p14:sectionLst xmlns:p14="http://schemas.microsoft.com/office/powerpoint/2010/main">
         <p14:section name="Default Section" id="{AFE79185-5E17-2A46-AC7B-1D77715D18D8}">
           <p14:sldIdLst>
-            <p14:sldId id="269"/>
             <p14:sldId id="270"/>
             <p14:sldId id="271"/>
             <p14:sldId id="268"/>
-            <p14:sldId id="272"/>
           </p14:sldIdLst>
         </p14:section>
       </p14:sectionLst>
@@ -279,7 +275,7 @@
           <a:p>
             <a:fld id="{846CE7D5-CF57-46EF-B807-FDD0502418D4}" type="datetimeFigureOut">
               <a:rPr lang="en-GB" smtClean="0"/>
-              <a:t>06/11/2023</a:t>
+              <a:t>19/01/2024</a:t>
             </a:fld>
             <a:endParaRPr lang="en-GB"/>
           </a:p>
@@ -449,7 +445,7 @@
           <a:p>
             <a:fld id="{846CE7D5-CF57-46EF-B807-FDD0502418D4}" type="datetimeFigureOut">
               <a:rPr lang="en-GB" smtClean="0"/>
-              <a:t>06/11/2023</a:t>
+              <a:t>19/01/2024</a:t>
             </a:fld>
             <a:endParaRPr lang="en-GB"/>
           </a:p>
@@ -629,7 +625,7 @@
           <a:p>
             <a:fld id="{846CE7D5-CF57-46EF-B807-FDD0502418D4}" type="datetimeFigureOut">
               <a:rPr lang="en-GB" smtClean="0"/>
-              <a:t>06/11/2023</a:t>
+              <a:t>19/01/2024</a:t>
             </a:fld>
             <a:endParaRPr lang="en-GB"/>
           </a:p>
@@ -799,7 +795,7 @@
           <a:p>
             <a:fld id="{846CE7D5-CF57-46EF-B807-FDD0502418D4}" type="datetimeFigureOut">
               <a:rPr lang="en-GB" smtClean="0"/>
-              <a:t>06/11/2023</a:t>
+              <a:t>19/01/2024</a:t>
             </a:fld>
             <a:endParaRPr lang="en-GB"/>
           </a:p>
@@ -1045,7 +1041,7 @@
           <a:p>
             <a:fld id="{846CE7D5-CF57-46EF-B807-FDD0502418D4}" type="datetimeFigureOut">
               <a:rPr lang="en-GB" smtClean="0"/>
-              <a:t>06/11/2023</a:t>
+              <a:t>19/01/2024</a:t>
             </a:fld>
             <a:endParaRPr lang="en-GB"/>
           </a:p>
@@ -1277,7 +1273,7 @@
           <a:p>
             <a:fld id="{846CE7D5-CF57-46EF-B807-FDD0502418D4}" type="datetimeFigureOut">
               <a:rPr lang="en-GB" smtClean="0"/>
-              <a:t>06/11/2023</a:t>
+              <a:t>19/01/2024</a:t>
             </a:fld>
             <a:endParaRPr lang="en-GB"/>
           </a:p>
@@ -1644,7 +1640,7 @@
           <a:p>
             <a:fld id="{846CE7D5-CF57-46EF-B807-FDD0502418D4}" type="datetimeFigureOut">
               <a:rPr lang="en-GB" smtClean="0"/>
-              <a:t>06/11/2023</a:t>
+              <a:t>19/01/2024</a:t>
             </a:fld>
             <a:endParaRPr lang="en-GB"/>
           </a:p>
@@ -1762,7 +1758,7 @@
           <a:p>
             <a:fld id="{846CE7D5-CF57-46EF-B807-FDD0502418D4}" type="datetimeFigureOut">
               <a:rPr lang="en-GB" smtClean="0"/>
-              <a:t>06/11/2023</a:t>
+              <a:t>19/01/2024</a:t>
             </a:fld>
             <a:endParaRPr lang="en-GB"/>
           </a:p>
@@ -1857,7 +1853,7 @@
           <a:p>
             <a:fld id="{846CE7D5-CF57-46EF-B807-FDD0502418D4}" type="datetimeFigureOut">
               <a:rPr lang="en-GB" smtClean="0"/>
-              <a:t>06/11/2023</a:t>
+              <a:t>19/01/2024</a:t>
             </a:fld>
             <a:endParaRPr lang="en-GB"/>
           </a:p>
@@ -2134,7 +2130,7 @@
           <a:p>
             <a:fld id="{846CE7D5-CF57-46EF-B807-FDD0502418D4}" type="datetimeFigureOut">
               <a:rPr lang="en-GB" smtClean="0"/>
-              <a:t>06/11/2023</a:t>
+              <a:t>19/01/2024</a:t>
             </a:fld>
             <a:endParaRPr lang="en-GB"/>
           </a:p>
@@ -2391,7 +2387,7 @@
           <a:p>
             <a:fld id="{846CE7D5-CF57-46EF-B807-FDD0502418D4}" type="datetimeFigureOut">
               <a:rPr lang="en-GB" smtClean="0"/>
-              <a:t>06/11/2023</a:t>
+              <a:t>19/01/2024</a:t>
             </a:fld>
             <a:endParaRPr lang="en-GB"/>
           </a:p>
@@ -2604,7 +2600,7 @@
           <a:p>
             <a:fld id="{846CE7D5-CF57-46EF-B807-FDD0502418D4}" type="datetimeFigureOut">
               <a:rPr lang="en-GB" smtClean="0"/>
-              <a:t>06/11/2023</a:t>
+              <a:t>19/01/2024</a:t>
             </a:fld>
             <a:endParaRPr lang="en-GB"/>
           </a:p>
@@ -3009,66 +3005,6 @@
           <a:chExt cx="0" cy="0"/>
         </a:xfrm>
       </p:grpSpPr>
-      <p:pic>
-        <p:nvPicPr>
-          <p:cNvPr id="4" name="Picture 3">
-            <a:extLst>
-              <a:ext uri="{FF2B5EF4-FFF2-40B4-BE49-F238E27FC236}">
-                <a16:creationId xmlns:a16="http://schemas.microsoft.com/office/drawing/2014/main" id="{995F7C61-9E1F-CC97-2832-867E91F5E5B0}"/>
-              </a:ext>
-            </a:extLst>
-          </p:cNvPr>
-          <p:cNvPicPr>
-            <a:picLocks noChangeAspect="1"/>
-          </p:cNvPicPr>
-          <p:nvPr/>
-        </p:nvPicPr>
-        <p:blipFill>
-          <a:blip r:embed="rId2"/>
-          <a:stretch>
-            <a:fillRect/>
-          </a:stretch>
-        </p:blipFill>
-        <p:spPr>
-          <a:xfrm>
-            <a:off x="0" y="1000973"/>
-            <a:ext cx="12192000" cy="4856054"/>
-          </a:xfrm>
-          <a:prstGeom prst="rect">
-            <a:avLst/>
-          </a:prstGeom>
-        </p:spPr>
-      </p:pic>
-    </p:spTree>
-    <p:extLst>
-      <p:ext uri="{BB962C8B-B14F-4D97-AF65-F5344CB8AC3E}">
-        <p14:creationId xmlns:p14="http://schemas.microsoft.com/office/powerpoint/2010/main" val="116875583"/>
-      </p:ext>
-    </p:extLst>
-  </p:cSld>
-  <p:clrMapOvr>
-    <a:masterClrMapping/>
-  </p:clrMapOvr>
-</p:sld>
-</file>
-
-<file path=ppt/slides/slide2.xml><?xml version="1.0" encoding="utf-8"?>
-<p:sld xmlns:a="http://schemas.openxmlformats.org/drawingml/2006/main" xmlns:r="http://schemas.openxmlformats.org/officeDocument/2006/relationships" xmlns:p="http://schemas.openxmlformats.org/presentationml/2006/main">
-  <p:cSld>
-    <p:spTree>
-      <p:nvGrpSpPr>
-        <p:cNvPr id="1" name=""/>
-        <p:cNvGrpSpPr/>
-        <p:nvPr/>
-      </p:nvGrpSpPr>
-      <p:grpSpPr>
-        <a:xfrm>
-          <a:off x="0" y="0"/>
-          <a:ext cx="0" cy="0"/>
-          <a:chOff x="0" y="0"/>
-          <a:chExt cx="0" cy="0"/>
-        </a:xfrm>
-      </p:grpSpPr>
       <p:cxnSp>
         <p:nvCxnSpPr>
           <p:cNvPr id="403" name="Straight Connector 402">
@@ -7937,7 +7873,7 @@
 </p:sld>
 </file>
 
-<file path=ppt/slides/slide3.xml><?xml version="1.0" encoding="utf-8"?>
+<file path=ppt/slides/slide2.xml><?xml version="1.0" encoding="utf-8"?>
 <p:sld xmlns:a="http://schemas.openxmlformats.org/drawingml/2006/main" xmlns:r="http://schemas.openxmlformats.org/officeDocument/2006/relationships" xmlns:p="http://schemas.openxmlformats.org/presentationml/2006/main">
   <p:cSld>
     <p:spTree>
@@ -13064,7 +13000,7 @@
 </p:sld>
 </file>
 
-<file path=ppt/slides/slide4.xml><?xml version="1.0" encoding="utf-8"?>
+<file path=ppt/slides/slide3.xml><?xml version="1.0" encoding="utf-8"?>
 <p:sld xmlns:a="http://schemas.openxmlformats.org/drawingml/2006/main" xmlns:r="http://schemas.openxmlformats.org/officeDocument/2006/relationships" xmlns:p="http://schemas.openxmlformats.org/presentationml/2006/main">
   <p:cSld>
     <p:spTree>
@@ -14566,66 +14502,6 @@
     <p:extLst>
       <p:ext uri="{BB962C8B-B14F-4D97-AF65-F5344CB8AC3E}">
         <p14:creationId xmlns:p14="http://schemas.microsoft.com/office/powerpoint/2010/main" val="678349397"/>
-      </p:ext>
-    </p:extLst>
-  </p:cSld>
-  <p:clrMapOvr>
-    <a:masterClrMapping/>
-  </p:clrMapOvr>
-</p:sld>
-</file>
-
-<file path=ppt/slides/slide5.xml><?xml version="1.0" encoding="utf-8"?>
-<p:sld xmlns:a="http://schemas.openxmlformats.org/drawingml/2006/main" xmlns:r="http://schemas.openxmlformats.org/officeDocument/2006/relationships" xmlns:p="http://schemas.openxmlformats.org/presentationml/2006/main">
-  <p:cSld>
-    <p:spTree>
-      <p:nvGrpSpPr>
-        <p:cNvPr id="1" name=""/>
-        <p:cNvGrpSpPr/>
-        <p:nvPr/>
-      </p:nvGrpSpPr>
-      <p:grpSpPr>
-        <a:xfrm>
-          <a:off x="0" y="0"/>
-          <a:ext cx="0" cy="0"/>
-          <a:chOff x="0" y="0"/>
-          <a:chExt cx="0" cy="0"/>
-        </a:xfrm>
-      </p:grpSpPr>
-      <p:pic>
-        <p:nvPicPr>
-          <p:cNvPr id="4" name="Picture 3">
-            <a:extLst>
-              <a:ext uri="{FF2B5EF4-FFF2-40B4-BE49-F238E27FC236}">
-                <a16:creationId xmlns:a16="http://schemas.microsoft.com/office/drawing/2014/main" id="{DFEFF8BE-0BE2-7837-F344-D651D7F49F93}"/>
-              </a:ext>
-            </a:extLst>
-          </p:cNvPr>
-          <p:cNvPicPr>
-            <a:picLocks noChangeAspect="1"/>
-          </p:cNvPicPr>
-          <p:nvPr/>
-        </p:nvPicPr>
-        <p:blipFill>
-          <a:blip r:embed="rId2"/>
-          <a:stretch>
-            <a:fillRect/>
-          </a:stretch>
-        </p:blipFill>
-        <p:spPr>
-          <a:xfrm>
-            <a:off x="2209800" y="1866992"/>
-            <a:ext cx="7772400" cy="3124015"/>
-          </a:xfrm>
-          <a:prstGeom prst="rect">
-            <a:avLst/>
-          </a:prstGeom>
-        </p:spPr>
-      </p:pic>
-    </p:spTree>
-    <p:extLst>
-      <p:ext uri="{BB962C8B-B14F-4D97-AF65-F5344CB8AC3E}">
-        <p14:creationId xmlns:p14="http://schemas.microsoft.com/office/powerpoint/2010/main" val="1932036832"/>
       </p:ext>
     </p:extLst>
   </p:cSld>
@@ -14897,26 +14773,6 @@
 </file>
 
 <file path=customXml/item1.xml><?xml version="1.0" encoding="utf-8"?>
-<p:properties xmlns:p="http://schemas.microsoft.com/office/2006/metadata/properties" xmlns:xsi="http://www.w3.org/2001/XMLSchema-instance" xmlns:pc="http://schemas.microsoft.com/office/infopath/2007/PartnerControls">
-  <documentManagement>
-    <TaxCatchAll xmlns="53f4c8c3-1e11-42c5-9e45-23caa343854e" xsi:nil="true"/>
-    <lcf76f155ced4ddcb4097134ff3c332f xmlns="d4f3b8d6-0b2b-45f5-9c62-2ff0f55e706b">
-      <Terms xmlns="http://schemas.microsoft.com/office/infopath/2007/PartnerControls"/>
-    </lcf76f155ced4ddcb4097134ff3c332f>
-  </documentManagement>
-</p:properties>
-</file>
-
-<file path=customXml/item2.xml><?xml version="1.0" encoding="utf-8"?>
-<?mso-contentType ?>
-<FormTemplates xmlns="http://schemas.microsoft.com/sharepoint/v3/contenttype/forms">
-  <Display>DocumentLibraryForm</Display>
-  <Edit>DocumentLibraryForm</Edit>
-  <New>DocumentLibraryForm</New>
-</FormTemplates>
-</file>
-
-<file path=customXml/item3.xml><?xml version="1.0" encoding="utf-8"?>
 <ct:contentTypeSchema xmlns:ct="http://schemas.microsoft.com/office/2006/metadata/contentType" xmlns:ma="http://schemas.microsoft.com/office/2006/metadata/properties/metaAttributes" ct:_="" ma:_="" ma:contentTypeName="Document" ma:contentTypeID="0x010100D9E37B08EC30D342AD56326BF7B9DC9D" ma:contentTypeVersion="14" ma:contentTypeDescription="Create a new document." ma:contentTypeScope="" ma:versionID="cb418b40aec74af0a1404b8c68565b51">
   <xsd:schema xmlns:xsd="http://www.w3.org/2001/XMLSchema" xmlns:xs="http://www.w3.org/2001/XMLSchema" xmlns:p="http://schemas.microsoft.com/office/2006/metadata/properties" xmlns:ns2="53f4c8c3-1e11-42c5-9e45-23caa343854e" xmlns:ns3="d4f3b8d6-0b2b-45f5-9c62-2ff0f55e706b" targetNamespace="http://schemas.microsoft.com/office/2006/metadata/properties" ma:root="true" ma:fieldsID="b3ba8417e25b96582c860f8ab4ed1579" ns2:_="" ns3:_="">
     <xsd:import namespace="53f4c8c3-1e11-42c5-9e45-23caa343854e"/>
@@ -15145,26 +15001,27 @@
 </ct:contentTypeSchema>
 </file>
 
-<file path=customXml/itemProps1.xml><?xml version="1.0" encoding="utf-8"?>
-<ds:datastoreItem xmlns:ds="http://schemas.openxmlformats.org/officeDocument/2006/customXml" ds:itemID="{C9C0FA62-5935-4018-83DA-AC73198265C4}">
-  <ds:schemaRefs>
-    <ds:schemaRef ds:uri="53f4c8c3-1e11-42c5-9e45-23caa343854e"/>
-    <ds:schemaRef ds:uri="d4f3b8d6-0b2b-45f5-9c62-2ff0f55e706b"/>
-    <ds:schemaRef ds:uri="http://schemas.microsoft.com/office/2006/metadata/properties"/>
-    <ds:schemaRef ds:uri="http://schemas.microsoft.com/office/infopath/2007/PartnerControls"/>
-  </ds:schemaRefs>
-</ds:datastoreItem>
+<file path=customXml/item2.xml><?xml version="1.0" encoding="utf-8"?>
+<?mso-contentType ?>
+<FormTemplates xmlns="http://schemas.microsoft.com/sharepoint/v3/contenttype/forms">
+  <Display>DocumentLibraryForm</Display>
+  <Edit>DocumentLibraryForm</Edit>
+  <New>DocumentLibraryForm</New>
+</FormTemplates>
 </file>
 
-<file path=customXml/itemProps2.xml><?xml version="1.0" encoding="utf-8"?>
-<ds:datastoreItem xmlns:ds="http://schemas.openxmlformats.org/officeDocument/2006/customXml" ds:itemID="{5D521BC6-6034-441E-90C6-0E0FE416D799}">
-  <ds:schemaRefs>
-    <ds:schemaRef ds:uri="http://schemas.microsoft.com/sharepoint/v3/contenttype/forms"/>
-  </ds:schemaRefs>
-</ds:datastoreItem>
+<file path=customXml/item3.xml><?xml version="1.0" encoding="utf-8"?>
+<p:properties xmlns:p="http://schemas.microsoft.com/office/2006/metadata/properties" xmlns:xsi="http://www.w3.org/2001/XMLSchema-instance" xmlns:pc="http://schemas.microsoft.com/office/infopath/2007/PartnerControls">
+  <documentManagement>
+    <TaxCatchAll xmlns="53f4c8c3-1e11-42c5-9e45-23caa343854e" xsi:nil="true"/>
+    <lcf76f155ced4ddcb4097134ff3c332f xmlns="d4f3b8d6-0b2b-45f5-9c62-2ff0f55e706b">
+      <Terms xmlns="http://schemas.microsoft.com/office/infopath/2007/PartnerControls"/>
+    </lcf76f155ced4ddcb4097134ff3c332f>
+  </documentManagement>
+</p:properties>
 </file>
 
-<file path=customXml/itemProps3.xml><?xml version="1.0" encoding="utf-8"?>
+<file path=customXml/itemProps1.xml><?xml version="1.0" encoding="utf-8"?>
 <ds:datastoreItem xmlns:ds="http://schemas.openxmlformats.org/officeDocument/2006/customXml" ds:itemID="{ADF8B5B4-24F3-4ADC-9825-ECF85642B718}">
   <ds:schemaRefs>
     <ds:schemaRef ds:uri="53f4c8c3-1e11-42c5-9e45-23caa343854e"/>
@@ -15181,4 +15038,23 @@
     <ds:schemaRef ds:uri="http://www.w3.org/2001/XMLSchema"/>
   </ds:schemaRefs>
 </ds:datastoreItem>
+</file>
+
+<file path=customXml/itemProps2.xml><?xml version="1.0" encoding="utf-8"?>
+<ds:datastoreItem xmlns:ds="http://schemas.openxmlformats.org/officeDocument/2006/customXml" ds:itemID="{5D521BC6-6034-441E-90C6-0E0FE416D799}">
+  <ds:schemaRefs>
+    <ds:schemaRef ds:uri="http://schemas.microsoft.com/sharepoint/v3/contenttype/forms"/>
+  </ds:schemaRefs>
+</ds:datastoreItem>
+</file>
+
+<file path=customXml/itemProps3.xml><?xml version="1.0" encoding="utf-8"?>
+<ds:datastoreItem xmlns:ds="http://schemas.openxmlformats.org/officeDocument/2006/customXml" ds:itemID="{C9C0FA62-5935-4018-83DA-AC73198265C4}">
+  <ds:schemaRefs>
+    <ds:schemaRef ds:uri="53f4c8c3-1e11-42c5-9e45-23caa343854e"/>
+    <ds:schemaRef ds:uri="d4f3b8d6-0b2b-45f5-9c62-2ff0f55e706b"/>
+    <ds:schemaRef ds:uri="http://schemas.microsoft.com/office/2006/metadata/properties"/>
+    <ds:schemaRef ds:uri="http://schemas.microsoft.com/office/infopath/2007/PartnerControls"/>
+  </ds:schemaRefs>
+</ds:datastoreItem>
 </file>
</xml_diff>